<commit_message>
Modified PPT and PDF and deleted unwanted images
</commit_message>
<xml_diff>
--- a/docs/Midterm-Presentations/Library Management System_MidTerm_Presentation.pptx
+++ b/docs/Midterm-Presentations/Library Management System_MidTerm_Presentation.pptx
@@ -4706,7 +4706,12 @@
             <p:ph type="title"/>
           </p:nvPr>
         </p:nvSpPr>
-        <p:spPr/>
+        <p:spPr>
+          <a:xfrm>
+            <a:off x="609600" y="556488"/>
+            <a:ext cx="10972800" cy="1325563"/>
+          </a:xfrm>
+        </p:spPr>
         <p:txBody>
           <a:bodyPr/>
           <a:lstStyle/>
@@ -4749,6 +4754,36 @@
           </a:p>
         </p:txBody>
       </p:sp>
+      <p:pic>
+        <p:nvPicPr>
+          <p:cNvPr id="5" name="Picture 4">
+            <a:extLst>
+              <a:ext uri="{FF2B5EF4-FFF2-40B4-BE49-F238E27FC236}">
+                <a16:creationId xmlns:a16="http://schemas.microsoft.com/office/drawing/2014/main" id="{2AF034D3-2D8F-4FD6-87D6-8B3137B164A6}"/>
+              </a:ext>
+            </a:extLst>
+          </p:cNvPr>
+          <p:cNvPicPr>
+            <a:picLocks noChangeAspect="1"/>
+          </p:cNvPicPr>
+          <p:nvPr/>
+        </p:nvPicPr>
+        <p:blipFill>
+          <a:blip r:embed="rId3"/>
+          <a:stretch>
+            <a:fillRect/>
+          </a:stretch>
+        </p:blipFill>
+        <p:spPr>
+          <a:xfrm>
+            <a:off x="266700" y="2023248"/>
+            <a:ext cx="11800098" cy="4343643"/>
+          </a:xfrm>
+          <a:prstGeom prst="rect">
+            <a:avLst/>
+          </a:prstGeom>
+        </p:spPr>
+      </p:pic>
     </p:spTree>
     <p:extLst>
       <p:ext uri="{BB962C8B-B14F-4D97-AF65-F5344CB8AC3E}">
@@ -4807,40 +4842,36 @@
           </a:p>
         </p:txBody>
       </p:sp>
-      <p:sp>
-        <p:nvSpPr>
-          <p:cNvPr id="3" name="Content Placeholder 2">
-            <a:extLst>
-              <a:ext uri="{FF2B5EF4-FFF2-40B4-BE49-F238E27FC236}">
-                <a16:creationId xmlns:a16="http://schemas.microsoft.com/office/drawing/2014/main" id="{BA86B82F-0B5E-455B-8CC3-C6CFAE8A8B80}"/>
-              </a:ext>
-            </a:extLst>
-          </p:cNvPr>
-          <p:cNvSpPr>
-            <a:spLocks noGrp="1"/>
-          </p:cNvSpPr>
-          <p:nvPr>
-            <p:ph idx="1"/>
-          </p:nvPr>
-        </p:nvSpPr>
-        <p:spPr/>
-        <p:txBody>
-          <a:bodyPr/>
-          <a:lstStyle/>
-          <a:p>
-            <a:r>
-              <a:rPr lang="en-US" dirty="0">
-                <a:hlinkClick r:id="rId2" action="ppaction://hlinkfile"/>
-              </a:rPr>
-              <a:t>Click here </a:t>
-            </a:r>
-            <a:r>
-              <a:rPr lang="en-US" dirty="0"/>
-              <a:t>for Activity Diagram</a:t>
-            </a:r>
-          </a:p>
-        </p:txBody>
-      </p:sp>
+      <p:pic>
+        <p:nvPicPr>
+          <p:cNvPr id="5" name="Picture 4">
+            <a:extLst>
+              <a:ext uri="{FF2B5EF4-FFF2-40B4-BE49-F238E27FC236}">
+                <a16:creationId xmlns:a16="http://schemas.microsoft.com/office/drawing/2014/main" id="{72A93D14-6C8B-4D5B-964F-B7B951C96927}"/>
+              </a:ext>
+            </a:extLst>
+          </p:cNvPr>
+          <p:cNvPicPr>
+            <a:picLocks noChangeAspect="1"/>
+          </p:cNvPicPr>
+          <p:nvPr/>
+        </p:nvPicPr>
+        <p:blipFill>
+          <a:blip r:embed="rId2"/>
+          <a:stretch>
+            <a:fillRect/>
+          </a:stretch>
+        </p:blipFill>
+        <p:spPr>
+          <a:xfrm>
+            <a:off x="6096000" y="0"/>
+            <a:ext cx="5147268" cy="6858000"/>
+          </a:xfrm>
+          <a:prstGeom prst="rect">
+            <a:avLst/>
+          </a:prstGeom>
+        </p:spPr>
+      </p:pic>
     </p:spTree>
     <p:extLst>
       <p:ext uri="{BB962C8B-B14F-4D97-AF65-F5344CB8AC3E}">
@@ -4889,12 +4920,21 @@
         </p:nvSpPr>
         <p:spPr/>
         <p:txBody>
-          <a:bodyPr/>
+          <a:bodyPr>
+            <a:normAutofit fontScale="90000"/>
+          </a:bodyPr>
           <a:lstStyle/>
           <a:p>
             <a:r>
               <a:rPr lang="en-US" dirty="0"/>
-              <a:t>Use-case Description</a:t>
+              <a:t>Use-case </a:t>
+            </a:r>
+            <a:br>
+              <a:rPr lang="en-US" dirty="0"/>
+            </a:br>
+            <a:r>
+              <a:rPr lang="en-US" dirty="0"/>
+              <a:t>Description</a:t>
             </a:r>
           </a:p>
         </p:txBody>
@@ -4923,8 +4963,8 @@
         </p:blipFill>
         <p:spPr>
           <a:xfrm>
-            <a:off x="2278787" y="1875532"/>
-            <a:ext cx="6315075" cy="4982468"/>
+            <a:off x="3725847" y="241161"/>
+            <a:ext cx="8080911" cy="6375677"/>
           </a:xfrm>
         </p:spPr>
       </p:pic>

</xml_diff>